<commit_message>
Real Final (maybe) commit
</commit_message>
<xml_diff>
--- a/src/24_양진모_과제_20210422.pptx
+++ b/src/24_양진모_과제_20210422.pptx
@@ -6857,7 +6857,7 @@
         </p:nvSpPr>
         <p:spPr bwMode="auto">
           <a:xfrm>
-            <a:off x="1858962" y="3737309"/>
+            <a:off x="1240654" y="3885355"/>
             <a:ext cx="8047038" cy="1295400"/>
           </a:xfrm>
           <a:prstGeom prst="rect">
@@ -7053,6 +7053,48 @@
             <a:r>
               <a:rPr lang="ko-KR" altLang="en-US" sz="2400" kern="0" dirty="0" err="1"/>
               <a:t>생성기</a:t>
+            </a:r>
+            <a:endParaRPr lang="en-US" altLang="ko-KR" sz="2400" kern="0" dirty="0"/>
+          </a:p>
+          <a:p>
+            <a:pPr marL="0" indent="0" eaLnBrk="1" hangingPunct="1">
+              <a:buClrTx/>
+            </a:pPr>
+            <a:endParaRPr lang="en-US" altLang="ko-KR" sz="2400" kern="0" dirty="0"/>
+          </a:p>
+          <a:p>
+            <a:pPr marL="0" indent="0" eaLnBrk="1" hangingPunct="1">
+              <a:buClrTx/>
+            </a:pPr>
+            <a:r>
+              <a:rPr lang="en-US" altLang="ko-KR" sz="2400" kern="0" dirty="0">
+                <a:hlinkClick r:id="rId2"/>
+              </a:rPr>
+              <a:t>kopo24 Git Hub</a:t>
+            </a:r>
+            <a:r>
+              <a:rPr lang="ko-KR" altLang="en-US" sz="2400" kern="0" dirty="0">
+                <a:hlinkClick r:id="rId2"/>
+              </a:rPr>
+              <a:t>로 이동</a:t>
+            </a:r>
+            <a:r>
+              <a:rPr lang="en-US" altLang="ko-KR" sz="2400" kern="0" dirty="0">
+                <a:hlinkClick r:id="rId2"/>
+              </a:rPr>
+              <a:t>!(</a:t>
+            </a:r>
+            <a:r>
+              <a:rPr lang="ko-KR" altLang="en-US" sz="2400" kern="0" dirty="0">
+                <a:hlinkClick r:id="rId2"/>
+              </a:rPr>
+              <a:t>나를 클릭해주세요</a:t>
+            </a:r>
+            <a:r>
+              <a:rPr lang="en-US" altLang="ko-KR" sz="2400" kern="0" dirty="0">
+                <a:hlinkClick r:id="rId2"/>
+              </a:rPr>
+              <a:t>!)</a:t>
             </a:r>
             <a:endParaRPr lang="ko-KR" altLang="en-US" sz="2400" kern="0" dirty="0"/>
           </a:p>

</xml_diff>